<commit_message>
quick fix in Class Diagram
</commit_message>
<xml_diff>
--- a/Documents/ClassDiagram.pptx
+++ b/Documents/ClassDiagram.pptx
@@ -289,7 +289,7 @@
             <a:fld id="{BAF09E74-5774-F145-AC14-13E3AE904401}" type="datetimeFigureOut">
               <a:rPr lang="nl-NL" smtClean="0"/>
               <a:pPr/>
-              <a:t>23/05/15</a:t>
+              <a:t>8-7-2015</a:t>
             </a:fld>
             <a:endParaRPr lang="nl-NL"/>
           </a:p>
@@ -332,7 +332,7 @@
             <a:fld id="{6D59DADF-35B0-8442-AF3F-7D54891C5B27}" type="slidenum">
               <a:rPr lang="nl-NL" smtClean="0"/>
               <a:pPr/>
-              <a:t>‹nr.›</a:t>
+              <a:t>‹#›</a:t>
             </a:fld>
             <a:endParaRPr lang="nl-NL"/>
           </a:p>
@@ -341,7 +341,7 @@
     </p:spTree>
     <p:extLst>
       <p:ext uri="{BB962C8B-B14F-4D97-AF65-F5344CB8AC3E}">
-        <p14:creationId xmlns:p14="http://schemas.microsoft.com/office/powerpoint/2010/main" val="2833105150"/>
+        <p14:creationId xmlns:p14="http://schemas.microsoft.com/office/powerpoint/2010/main" xmlns="" val="2833105150"/>
       </p:ext>
     </p:extLst>
   </p:cSld>
@@ -461,7 +461,7 @@
             <a:fld id="{BAF09E74-5774-F145-AC14-13E3AE904401}" type="datetimeFigureOut">
               <a:rPr lang="nl-NL" smtClean="0"/>
               <a:pPr/>
-              <a:t>23/05/15</a:t>
+              <a:t>8-7-2015</a:t>
             </a:fld>
             <a:endParaRPr lang="nl-NL"/>
           </a:p>
@@ -504,7 +504,7 @@
             <a:fld id="{6D59DADF-35B0-8442-AF3F-7D54891C5B27}" type="slidenum">
               <a:rPr lang="nl-NL" smtClean="0"/>
               <a:pPr/>
-              <a:t>‹nr.›</a:t>
+              <a:t>‹#›</a:t>
             </a:fld>
             <a:endParaRPr lang="nl-NL"/>
           </a:p>
@@ -513,7 +513,7 @@
     </p:spTree>
     <p:extLst>
       <p:ext uri="{BB962C8B-B14F-4D97-AF65-F5344CB8AC3E}">
-        <p14:creationId xmlns:p14="http://schemas.microsoft.com/office/powerpoint/2010/main" val="547624687"/>
+        <p14:creationId xmlns:p14="http://schemas.microsoft.com/office/powerpoint/2010/main" xmlns="" val="547624687"/>
       </p:ext>
     </p:extLst>
   </p:cSld>
@@ -643,7 +643,7 @@
             <a:fld id="{BAF09E74-5774-F145-AC14-13E3AE904401}" type="datetimeFigureOut">
               <a:rPr lang="nl-NL" smtClean="0"/>
               <a:pPr/>
-              <a:t>23/05/15</a:t>
+              <a:t>8-7-2015</a:t>
             </a:fld>
             <a:endParaRPr lang="nl-NL"/>
           </a:p>
@@ -686,7 +686,7 @@
             <a:fld id="{6D59DADF-35B0-8442-AF3F-7D54891C5B27}" type="slidenum">
               <a:rPr lang="nl-NL" smtClean="0"/>
               <a:pPr/>
-              <a:t>‹nr.›</a:t>
+              <a:t>‹#›</a:t>
             </a:fld>
             <a:endParaRPr lang="nl-NL"/>
           </a:p>
@@ -695,7 +695,7 @@
     </p:spTree>
     <p:extLst>
       <p:ext uri="{BB962C8B-B14F-4D97-AF65-F5344CB8AC3E}">
-        <p14:creationId xmlns:p14="http://schemas.microsoft.com/office/powerpoint/2010/main" val="3832215252"/>
+        <p14:creationId xmlns:p14="http://schemas.microsoft.com/office/powerpoint/2010/main" xmlns="" val="3832215252"/>
       </p:ext>
     </p:extLst>
   </p:cSld>
@@ -815,7 +815,7 @@
             <a:fld id="{BAF09E74-5774-F145-AC14-13E3AE904401}" type="datetimeFigureOut">
               <a:rPr lang="nl-NL" smtClean="0"/>
               <a:pPr/>
-              <a:t>23/05/15</a:t>
+              <a:t>8-7-2015</a:t>
             </a:fld>
             <a:endParaRPr lang="nl-NL"/>
           </a:p>
@@ -858,7 +858,7 @@
             <a:fld id="{6D59DADF-35B0-8442-AF3F-7D54891C5B27}" type="slidenum">
               <a:rPr lang="nl-NL" smtClean="0"/>
               <a:pPr/>
-              <a:t>‹nr.›</a:t>
+              <a:t>‹#›</a:t>
             </a:fld>
             <a:endParaRPr lang="nl-NL"/>
           </a:p>
@@ -867,7 +867,7 @@
     </p:spTree>
     <p:extLst>
       <p:ext uri="{BB962C8B-B14F-4D97-AF65-F5344CB8AC3E}">
-        <p14:creationId xmlns:p14="http://schemas.microsoft.com/office/powerpoint/2010/main" val="406829104"/>
+        <p14:creationId xmlns:p14="http://schemas.microsoft.com/office/powerpoint/2010/main" xmlns="" val="406829104"/>
       </p:ext>
     </p:extLst>
   </p:cSld>
@@ -1063,7 +1063,7 @@
             <a:fld id="{BAF09E74-5774-F145-AC14-13E3AE904401}" type="datetimeFigureOut">
               <a:rPr lang="nl-NL" smtClean="0"/>
               <a:pPr/>
-              <a:t>23/05/15</a:t>
+              <a:t>8-7-2015</a:t>
             </a:fld>
             <a:endParaRPr lang="nl-NL"/>
           </a:p>
@@ -1106,7 +1106,7 @@
             <a:fld id="{6D59DADF-35B0-8442-AF3F-7D54891C5B27}" type="slidenum">
               <a:rPr lang="nl-NL" smtClean="0"/>
               <a:pPr/>
-              <a:t>‹nr.›</a:t>
+              <a:t>‹#›</a:t>
             </a:fld>
             <a:endParaRPr lang="nl-NL"/>
           </a:p>
@@ -1115,7 +1115,7 @@
     </p:spTree>
     <p:extLst>
       <p:ext uri="{BB962C8B-B14F-4D97-AF65-F5344CB8AC3E}">
-        <p14:creationId xmlns:p14="http://schemas.microsoft.com/office/powerpoint/2010/main" val="4032166571"/>
+        <p14:creationId xmlns:p14="http://schemas.microsoft.com/office/powerpoint/2010/main" xmlns="" val="4032166571"/>
       </p:ext>
     </p:extLst>
   </p:cSld>
@@ -1353,7 +1353,7 @@
             <a:fld id="{BAF09E74-5774-F145-AC14-13E3AE904401}" type="datetimeFigureOut">
               <a:rPr lang="nl-NL" smtClean="0"/>
               <a:pPr/>
-              <a:t>23/05/15</a:t>
+              <a:t>8-7-2015</a:t>
             </a:fld>
             <a:endParaRPr lang="nl-NL"/>
           </a:p>
@@ -1396,7 +1396,7 @@
             <a:fld id="{6D59DADF-35B0-8442-AF3F-7D54891C5B27}" type="slidenum">
               <a:rPr lang="nl-NL" smtClean="0"/>
               <a:pPr/>
-              <a:t>‹nr.›</a:t>
+              <a:t>‹#›</a:t>
             </a:fld>
             <a:endParaRPr lang="nl-NL"/>
           </a:p>
@@ -1405,7 +1405,7 @@
     </p:spTree>
     <p:extLst>
       <p:ext uri="{BB962C8B-B14F-4D97-AF65-F5344CB8AC3E}">
-        <p14:creationId xmlns:p14="http://schemas.microsoft.com/office/powerpoint/2010/main" val="1494689933"/>
+        <p14:creationId xmlns:p14="http://schemas.microsoft.com/office/powerpoint/2010/main" xmlns="" val="1494689933"/>
       </p:ext>
     </p:extLst>
   </p:cSld>
@@ -1777,7 +1777,7 @@
             <a:fld id="{BAF09E74-5774-F145-AC14-13E3AE904401}" type="datetimeFigureOut">
               <a:rPr lang="nl-NL" smtClean="0"/>
               <a:pPr/>
-              <a:t>23/05/15</a:t>
+              <a:t>8-7-2015</a:t>
             </a:fld>
             <a:endParaRPr lang="nl-NL"/>
           </a:p>
@@ -1820,7 +1820,7 @@
             <a:fld id="{6D59DADF-35B0-8442-AF3F-7D54891C5B27}" type="slidenum">
               <a:rPr lang="nl-NL" smtClean="0"/>
               <a:pPr/>
-              <a:t>‹nr.›</a:t>
+              <a:t>‹#›</a:t>
             </a:fld>
             <a:endParaRPr lang="nl-NL"/>
           </a:p>
@@ -1829,7 +1829,7 @@
     </p:spTree>
     <p:extLst>
       <p:ext uri="{BB962C8B-B14F-4D97-AF65-F5344CB8AC3E}">
-        <p14:creationId xmlns:p14="http://schemas.microsoft.com/office/powerpoint/2010/main" val="1221107075"/>
+        <p14:creationId xmlns:p14="http://schemas.microsoft.com/office/powerpoint/2010/main" xmlns="" val="1221107075"/>
       </p:ext>
     </p:extLst>
   </p:cSld>
@@ -1897,7 +1897,7 @@
             <a:fld id="{BAF09E74-5774-F145-AC14-13E3AE904401}" type="datetimeFigureOut">
               <a:rPr lang="nl-NL" smtClean="0"/>
               <a:pPr/>
-              <a:t>23/05/15</a:t>
+              <a:t>8-7-2015</a:t>
             </a:fld>
             <a:endParaRPr lang="nl-NL"/>
           </a:p>
@@ -1940,7 +1940,7 @@
             <a:fld id="{6D59DADF-35B0-8442-AF3F-7D54891C5B27}" type="slidenum">
               <a:rPr lang="nl-NL" smtClean="0"/>
               <a:pPr/>
-              <a:t>‹nr.›</a:t>
+              <a:t>‹#›</a:t>
             </a:fld>
             <a:endParaRPr lang="nl-NL"/>
           </a:p>
@@ -1949,7 +1949,7 @@
     </p:spTree>
     <p:extLst>
       <p:ext uri="{BB962C8B-B14F-4D97-AF65-F5344CB8AC3E}">
-        <p14:creationId xmlns:p14="http://schemas.microsoft.com/office/powerpoint/2010/main" val="23264191"/>
+        <p14:creationId xmlns:p14="http://schemas.microsoft.com/office/powerpoint/2010/main" xmlns="" val="23264191"/>
       </p:ext>
     </p:extLst>
   </p:cSld>
@@ -1994,7 +1994,7 @@
             <a:fld id="{BAF09E74-5774-F145-AC14-13E3AE904401}" type="datetimeFigureOut">
               <a:rPr lang="nl-NL" smtClean="0"/>
               <a:pPr/>
-              <a:t>23/05/15</a:t>
+              <a:t>8-7-2015</a:t>
             </a:fld>
             <a:endParaRPr lang="nl-NL"/>
           </a:p>
@@ -2037,7 +2037,7 @@
             <a:fld id="{6D59DADF-35B0-8442-AF3F-7D54891C5B27}" type="slidenum">
               <a:rPr lang="nl-NL" smtClean="0"/>
               <a:pPr/>
-              <a:t>‹nr.›</a:t>
+              <a:t>‹#›</a:t>
             </a:fld>
             <a:endParaRPr lang="nl-NL"/>
           </a:p>
@@ -2046,7 +2046,7 @@
     </p:spTree>
     <p:extLst>
       <p:ext uri="{BB962C8B-B14F-4D97-AF65-F5344CB8AC3E}">
-        <p14:creationId xmlns:p14="http://schemas.microsoft.com/office/powerpoint/2010/main" val="461564456"/>
+        <p14:creationId xmlns:p14="http://schemas.microsoft.com/office/powerpoint/2010/main" xmlns="" val="461564456"/>
       </p:ext>
     </p:extLst>
   </p:cSld>
@@ -2273,7 +2273,7 @@
             <a:fld id="{BAF09E74-5774-F145-AC14-13E3AE904401}" type="datetimeFigureOut">
               <a:rPr lang="nl-NL" smtClean="0"/>
               <a:pPr/>
-              <a:t>23/05/15</a:t>
+              <a:t>8-7-2015</a:t>
             </a:fld>
             <a:endParaRPr lang="nl-NL"/>
           </a:p>
@@ -2316,7 +2316,7 @@
             <a:fld id="{6D59DADF-35B0-8442-AF3F-7D54891C5B27}" type="slidenum">
               <a:rPr lang="nl-NL" smtClean="0"/>
               <a:pPr/>
-              <a:t>‹nr.›</a:t>
+              <a:t>‹#›</a:t>
             </a:fld>
             <a:endParaRPr lang="nl-NL"/>
           </a:p>
@@ -2325,7 +2325,7 @@
     </p:spTree>
     <p:extLst>
       <p:ext uri="{BB962C8B-B14F-4D97-AF65-F5344CB8AC3E}">
-        <p14:creationId xmlns:p14="http://schemas.microsoft.com/office/powerpoint/2010/main" val="3656418691"/>
+        <p14:creationId xmlns:p14="http://schemas.microsoft.com/office/powerpoint/2010/main" xmlns="" val="3656418691"/>
       </p:ext>
     </p:extLst>
   </p:cSld>
@@ -2528,7 +2528,7 @@
             <a:fld id="{BAF09E74-5774-F145-AC14-13E3AE904401}" type="datetimeFigureOut">
               <a:rPr lang="nl-NL" smtClean="0"/>
               <a:pPr/>
-              <a:t>23/05/15</a:t>
+              <a:t>8-7-2015</a:t>
             </a:fld>
             <a:endParaRPr lang="nl-NL"/>
           </a:p>
@@ -2571,7 +2571,7 @@
             <a:fld id="{6D59DADF-35B0-8442-AF3F-7D54891C5B27}" type="slidenum">
               <a:rPr lang="nl-NL" smtClean="0"/>
               <a:pPr/>
-              <a:t>‹nr.›</a:t>
+              <a:t>‹#›</a:t>
             </a:fld>
             <a:endParaRPr lang="nl-NL"/>
           </a:p>
@@ -2580,7 +2580,7 @@
     </p:spTree>
     <p:extLst>
       <p:ext uri="{BB962C8B-B14F-4D97-AF65-F5344CB8AC3E}">
-        <p14:creationId xmlns:p14="http://schemas.microsoft.com/office/powerpoint/2010/main" val="2512410003"/>
+        <p14:creationId xmlns:p14="http://schemas.microsoft.com/office/powerpoint/2010/main" xmlns="" val="2512410003"/>
       </p:ext>
     </p:extLst>
   </p:cSld>
@@ -2743,7 +2743,7 @@
             <a:fld id="{BAF09E74-5774-F145-AC14-13E3AE904401}" type="datetimeFigureOut">
               <a:rPr lang="nl-NL" smtClean="0"/>
               <a:pPr/>
-              <a:t>23/05/15</a:t>
+              <a:t>8-7-2015</a:t>
             </a:fld>
             <a:endParaRPr lang="nl-NL"/>
           </a:p>
@@ -2822,7 +2822,7 @@
             <a:fld id="{6D59DADF-35B0-8442-AF3F-7D54891C5B27}" type="slidenum">
               <a:rPr lang="nl-NL" smtClean="0"/>
               <a:pPr/>
-              <a:t>‹nr.›</a:t>
+              <a:t>‹#›</a:t>
             </a:fld>
             <a:endParaRPr lang="nl-NL"/>
           </a:p>
@@ -2831,7 +2831,7 @@
     </p:spTree>
     <p:extLst>
       <p:ext uri="{BB962C8B-B14F-4D97-AF65-F5344CB8AC3E}">
-        <p14:creationId xmlns:p14="http://schemas.microsoft.com/office/powerpoint/2010/main" val="3782918827"/>
+        <p14:creationId xmlns:p14="http://schemas.microsoft.com/office/powerpoint/2010/main" xmlns="" val="3782918827"/>
       </p:ext>
     </p:extLst>
   </p:cSld>
@@ -3737,7 +3737,9 @@
           <a:prstGeom prst="roundRect">
             <a:avLst/>
           </a:prstGeom>
-          <a:ln/>
+          <a:ln w="25400">
+            <a:prstDash val="dash"/>
+          </a:ln>
         </p:spPr>
         <p:style>
           <a:lnRef idx="1">
@@ -4702,7 +4704,7 @@
     </p:spTree>
     <p:extLst>
       <p:ext uri="{BB962C8B-B14F-4D97-AF65-F5344CB8AC3E}">
-        <p14:creationId xmlns:p14="http://schemas.microsoft.com/office/powerpoint/2010/main" val="907461295"/>
+        <p14:creationId xmlns:p14="http://schemas.microsoft.com/office/powerpoint/2010/main" xmlns="" val="907461295"/>
       </p:ext>
     </p:extLst>
   </p:cSld>
@@ -4712,7 +4714,7 @@
   <p:timing>
     <p:tnLst>
       <p:par>
-        <p:cTn xmlns:p14="http://schemas.microsoft.com/office/powerpoint/2010/main" id="1" dur="indefinite" restart="never" nodeType="tmRoot"/>
+        <p:cTn id="1" dur="indefinite" restart="never" nodeType="tmRoot"/>
       </p:par>
     </p:tnLst>
   </p:timing>

</xml_diff>

<commit_message>
enhancement - The TreeView is now updated as soon as a new link is created.
</commit_message>
<xml_diff>
--- a/Documents/ClassDiagram.pptx
+++ b/Documents/ClassDiagram.pptx
@@ -289,7 +289,7 @@
             <a:fld id="{BAF09E74-5774-F145-AC14-13E3AE904401}" type="datetimeFigureOut">
               <a:rPr lang="nl-NL" smtClean="0"/>
               <a:pPr/>
-              <a:t>11/07/15</a:t>
+              <a:t>12/07/15</a:t>
             </a:fld>
             <a:endParaRPr lang="nl-NL"/>
           </a:p>
@@ -461,7 +461,7 @@
             <a:fld id="{BAF09E74-5774-F145-AC14-13E3AE904401}" type="datetimeFigureOut">
               <a:rPr lang="nl-NL" smtClean="0"/>
               <a:pPr/>
-              <a:t>11/07/15</a:t>
+              <a:t>12/07/15</a:t>
             </a:fld>
             <a:endParaRPr lang="nl-NL"/>
           </a:p>
@@ -643,7 +643,7 @@
             <a:fld id="{BAF09E74-5774-F145-AC14-13E3AE904401}" type="datetimeFigureOut">
               <a:rPr lang="nl-NL" smtClean="0"/>
               <a:pPr/>
-              <a:t>11/07/15</a:t>
+              <a:t>12/07/15</a:t>
             </a:fld>
             <a:endParaRPr lang="nl-NL"/>
           </a:p>
@@ -815,7 +815,7 @@
             <a:fld id="{BAF09E74-5774-F145-AC14-13E3AE904401}" type="datetimeFigureOut">
               <a:rPr lang="nl-NL" smtClean="0"/>
               <a:pPr/>
-              <a:t>11/07/15</a:t>
+              <a:t>12/07/15</a:t>
             </a:fld>
             <a:endParaRPr lang="nl-NL"/>
           </a:p>
@@ -1063,7 +1063,7 @@
             <a:fld id="{BAF09E74-5774-F145-AC14-13E3AE904401}" type="datetimeFigureOut">
               <a:rPr lang="nl-NL" smtClean="0"/>
               <a:pPr/>
-              <a:t>11/07/15</a:t>
+              <a:t>12/07/15</a:t>
             </a:fld>
             <a:endParaRPr lang="nl-NL"/>
           </a:p>
@@ -1353,7 +1353,7 @@
             <a:fld id="{BAF09E74-5774-F145-AC14-13E3AE904401}" type="datetimeFigureOut">
               <a:rPr lang="nl-NL" smtClean="0"/>
               <a:pPr/>
-              <a:t>11/07/15</a:t>
+              <a:t>12/07/15</a:t>
             </a:fld>
             <a:endParaRPr lang="nl-NL"/>
           </a:p>
@@ -1777,7 +1777,7 @@
             <a:fld id="{BAF09E74-5774-F145-AC14-13E3AE904401}" type="datetimeFigureOut">
               <a:rPr lang="nl-NL" smtClean="0"/>
               <a:pPr/>
-              <a:t>11/07/15</a:t>
+              <a:t>12/07/15</a:t>
             </a:fld>
             <a:endParaRPr lang="nl-NL"/>
           </a:p>
@@ -1897,7 +1897,7 @@
             <a:fld id="{BAF09E74-5774-F145-AC14-13E3AE904401}" type="datetimeFigureOut">
               <a:rPr lang="nl-NL" smtClean="0"/>
               <a:pPr/>
-              <a:t>11/07/15</a:t>
+              <a:t>12/07/15</a:t>
             </a:fld>
             <a:endParaRPr lang="nl-NL"/>
           </a:p>
@@ -1994,7 +1994,7 @@
             <a:fld id="{BAF09E74-5774-F145-AC14-13E3AE904401}" type="datetimeFigureOut">
               <a:rPr lang="nl-NL" smtClean="0"/>
               <a:pPr/>
-              <a:t>11/07/15</a:t>
+              <a:t>12/07/15</a:t>
             </a:fld>
             <a:endParaRPr lang="nl-NL"/>
           </a:p>
@@ -2273,7 +2273,7 @@
             <a:fld id="{BAF09E74-5774-F145-AC14-13E3AE904401}" type="datetimeFigureOut">
               <a:rPr lang="nl-NL" smtClean="0"/>
               <a:pPr/>
-              <a:t>11/07/15</a:t>
+              <a:t>12/07/15</a:t>
             </a:fld>
             <a:endParaRPr lang="nl-NL"/>
           </a:p>
@@ -2528,7 +2528,7 @@
             <a:fld id="{BAF09E74-5774-F145-AC14-13E3AE904401}" type="datetimeFigureOut">
               <a:rPr lang="nl-NL" smtClean="0"/>
               <a:pPr/>
-              <a:t>11/07/15</a:t>
+              <a:t>12/07/15</a:t>
             </a:fld>
             <a:endParaRPr lang="nl-NL"/>
           </a:p>
@@ -2743,7 +2743,7 @@
             <a:fld id="{BAF09E74-5774-F145-AC14-13E3AE904401}" type="datetimeFigureOut">
               <a:rPr lang="nl-NL" smtClean="0"/>
               <a:pPr/>
-              <a:t>11/07/15</a:t>
+              <a:t>12/07/15</a:t>
             </a:fld>
             <a:endParaRPr lang="nl-NL"/>
           </a:p>
@@ -4690,7 +4690,7 @@
         </p:nvSpPr>
         <p:spPr>
           <a:xfrm>
-            <a:off x="7406530" y="2089168"/>
+            <a:off x="7292806" y="2089168"/>
             <a:ext cx="1413619" cy="309521"/>
           </a:xfrm>
           <a:prstGeom prst="roundRect">
@@ -4765,7 +4765,7 @@
         <p:spPr>
           <a:xfrm rot="10800000">
             <a:off x="6934200" y="2243927"/>
-            <a:ext cx="472331" cy="2"/>
+            <a:ext cx="358607" cy="2"/>
           </a:xfrm>
           <a:prstGeom prst="bentConnector3">
             <a:avLst>
@@ -4800,7 +4800,7 @@
         <p:spPr>
           <a:xfrm>
             <a:off x="6927848" y="1509669"/>
-            <a:ext cx="1185492" cy="579499"/>
+            <a:ext cx="1071768" cy="579499"/>
           </a:xfrm>
           <a:prstGeom prst="bentConnector2">
             <a:avLst/>

</xml_diff>